<commit_message>
20200415 git tutorial update
</commit_message>
<xml_diff>
--- a/github_tutorial.pptx
+++ b/github_tutorial.pptx
@@ -6,6 +6,12 @@
   </p:sldMasterIdLst>
   <p:sldIdLst>
     <p:sldId id="256" r:id="rId2"/>
+    <p:sldId id="260" r:id="rId3"/>
+    <p:sldId id="257" r:id="rId4"/>
+    <p:sldId id="262" r:id="rId5"/>
+    <p:sldId id="261" r:id="rId6"/>
+    <p:sldId id="258" r:id="rId7"/>
+    <p:sldId id="259" r:id="rId8"/>
   </p:sldIdLst>
   <p:sldSz cx="9144000" cy="6858000" type="screen4x3"/>
   <p:notesSz cx="6858000" cy="9144000"/>
@@ -3077,6 +3083,594 @@
     <p:extLst>
       <p:ext uri="{BB962C8B-B14F-4D97-AF65-F5344CB8AC3E}">
         <p14:creationId xmlns:p14="http://schemas.microsoft.com/office/powerpoint/2010/main" val="3006269490"/>
+      </p:ext>
+    </p:extLst>
+  </p:cSld>
+  <p:clrMapOvr>
+    <a:masterClrMapping/>
+  </p:clrMapOvr>
+</p:sld>
+</file>
+
+<file path=ppt/slides/slide2.xml><?xml version="1.0" encoding="utf-8"?>
+<p:sld xmlns:a="http://schemas.openxmlformats.org/drawingml/2006/main" xmlns:r="http://schemas.openxmlformats.org/officeDocument/2006/relationships" xmlns:p="http://schemas.openxmlformats.org/presentationml/2006/main">
+  <p:cSld>
+    <p:spTree>
+      <p:nvGrpSpPr>
+        <p:cNvPr id="1" name=""/>
+        <p:cNvGrpSpPr/>
+        <p:nvPr/>
+      </p:nvGrpSpPr>
+      <p:grpSpPr>
+        <a:xfrm>
+          <a:off x="0" y="0"/>
+          <a:ext cx="0" cy="0"/>
+          <a:chOff x="0" y="0"/>
+          <a:chExt cx="0" cy="0"/>
+        </a:xfrm>
+      </p:grpSpPr>
+      <p:sp>
+        <p:nvSpPr>
+          <p:cNvPr id="2" name="標題 1"/>
+          <p:cNvSpPr>
+            <a:spLocks noGrp="1"/>
+          </p:cNvSpPr>
+          <p:nvPr>
+            <p:ph type="title"/>
+          </p:nvPr>
+        </p:nvSpPr>
+        <p:spPr/>
+        <p:txBody>
+          <a:bodyPr/>
+          <a:lstStyle/>
+          <a:p>
+            <a:r>
+              <a:rPr lang="en-US" altLang="zh-TW" dirty="0" err="1" smtClean="0"/>
+              <a:t>Git</a:t>
+            </a:r>
+            <a:endParaRPr lang="zh-TW" altLang="en-US" dirty="0"/>
+          </a:p>
+        </p:txBody>
+      </p:sp>
+      <p:sp>
+        <p:nvSpPr>
+          <p:cNvPr id="3" name="內容版面配置區 2"/>
+          <p:cNvSpPr>
+            <a:spLocks noGrp="1"/>
+          </p:cNvSpPr>
+          <p:nvPr>
+            <p:ph idx="1"/>
+          </p:nvPr>
+        </p:nvSpPr>
+        <p:spPr/>
+        <p:txBody>
+          <a:bodyPr/>
+          <a:lstStyle/>
+          <a:p>
+            <a:endParaRPr lang="zh-TW" altLang="en-US"/>
+          </a:p>
+        </p:txBody>
+      </p:sp>
+    </p:spTree>
+    <p:extLst>
+      <p:ext uri="{BB962C8B-B14F-4D97-AF65-F5344CB8AC3E}">
+        <p14:creationId xmlns:p14="http://schemas.microsoft.com/office/powerpoint/2010/main" val="3338843509"/>
+      </p:ext>
+    </p:extLst>
+  </p:cSld>
+  <p:clrMapOvr>
+    <a:masterClrMapping/>
+  </p:clrMapOvr>
+</p:sld>
+</file>
+
+<file path=ppt/slides/slide3.xml><?xml version="1.0" encoding="utf-8"?>
+<p:sld xmlns:a="http://schemas.openxmlformats.org/drawingml/2006/main" xmlns:r="http://schemas.openxmlformats.org/officeDocument/2006/relationships" xmlns:p="http://schemas.openxmlformats.org/presentationml/2006/main">
+  <p:cSld>
+    <p:spTree>
+      <p:nvGrpSpPr>
+        <p:cNvPr id="1" name=""/>
+        <p:cNvGrpSpPr/>
+        <p:nvPr/>
+      </p:nvGrpSpPr>
+      <p:grpSpPr>
+        <a:xfrm>
+          <a:off x="0" y="0"/>
+          <a:ext cx="0" cy="0"/>
+          <a:chOff x="0" y="0"/>
+          <a:chExt cx="0" cy="0"/>
+        </a:xfrm>
+      </p:grpSpPr>
+      <p:sp>
+        <p:nvSpPr>
+          <p:cNvPr id="2" name="標題 1"/>
+          <p:cNvSpPr>
+            <a:spLocks noGrp="1"/>
+          </p:cNvSpPr>
+          <p:nvPr>
+            <p:ph type="title"/>
+          </p:nvPr>
+        </p:nvSpPr>
+        <p:spPr/>
+        <p:txBody>
+          <a:bodyPr/>
+          <a:lstStyle/>
+          <a:p>
+            <a:r>
+              <a:rPr lang="en-US" altLang="zh-TW" dirty="0" smtClean="0"/>
+              <a:t>Create local repository</a:t>
+            </a:r>
+            <a:endParaRPr lang="zh-TW" altLang="en-US" dirty="0"/>
+          </a:p>
+        </p:txBody>
+      </p:sp>
+      <p:sp>
+        <p:nvSpPr>
+          <p:cNvPr id="3" name="內容版面配置區 2"/>
+          <p:cNvSpPr>
+            <a:spLocks noGrp="1"/>
+          </p:cNvSpPr>
+          <p:nvPr>
+            <p:ph idx="1"/>
+          </p:nvPr>
+        </p:nvSpPr>
+        <p:spPr/>
+        <p:txBody>
+          <a:bodyPr>
+            <a:normAutofit lnSpcReduction="10000"/>
+          </a:bodyPr>
+          <a:lstStyle/>
+          <a:p>
+            <a:pPr marL="0" indent="0">
+              <a:buNone/>
+            </a:pPr>
+            <a:r>
+              <a:rPr lang="en-US" altLang="zh-TW" dirty="0" err="1" smtClean="0"/>
+              <a:t>mkdir</a:t>
+            </a:r>
+            <a:r>
+              <a:rPr lang="en-US" altLang="zh-TW" dirty="0" smtClean="0"/>
+              <a:t> project(create project folder)</a:t>
+            </a:r>
+          </a:p>
+          <a:p>
+            <a:pPr marL="0" indent="0">
+              <a:buNone/>
+            </a:pPr>
+            <a:r>
+              <a:rPr lang="en-US" altLang="zh-TW" dirty="0" smtClean="0"/>
+              <a:t>cd project(move into project folder)</a:t>
+            </a:r>
+          </a:p>
+          <a:p>
+            <a:pPr marL="0" indent="0">
+              <a:buNone/>
+            </a:pPr>
+            <a:r>
+              <a:rPr lang="en-US" altLang="zh-TW" dirty="0" err="1" smtClean="0"/>
+              <a:t>git</a:t>
+            </a:r>
+            <a:r>
+              <a:rPr lang="en-US" altLang="zh-TW" dirty="0" smtClean="0"/>
+              <a:t> </a:t>
+            </a:r>
+            <a:r>
+              <a:rPr lang="en-US" altLang="zh-TW" dirty="0" err="1" smtClean="0"/>
+              <a:t>init</a:t>
+            </a:r>
+            <a:r>
+              <a:rPr lang="en-US" altLang="zh-TW" dirty="0" smtClean="0"/>
+              <a:t>(initial local </a:t>
+            </a:r>
+            <a:r>
+              <a:rPr lang="en-US" altLang="zh-TW" dirty="0" err="1" smtClean="0"/>
+              <a:t>git</a:t>
+            </a:r>
+            <a:r>
+              <a:rPr lang="en-US" altLang="zh-TW" dirty="0" smtClean="0"/>
+              <a:t>)</a:t>
+            </a:r>
+          </a:p>
+          <a:p>
+            <a:pPr marL="0" indent="0">
+              <a:buNone/>
+            </a:pPr>
+            <a:r>
+              <a:rPr lang="en-US" altLang="zh-TW" dirty="0" smtClean="0"/>
+              <a:t>touch test.txt(create test.txt)</a:t>
+            </a:r>
+          </a:p>
+          <a:p>
+            <a:pPr marL="0" indent="0">
+              <a:buNone/>
+            </a:pPr>
+            <a:r>
+              <a:rPr lang="en-US" altLang="zh-TW" dirty="0" err="1"/>
+              <a:t>g</a:t>
+            </a:r>
+            <a:r>
+              <a:rPr lang="en-US" altLang="zh-TW" dirty="0" err="1" smtClean="0"/>
+              <a:t>it</a:t>
+            </a:r>
+            <a:r>
+              <a:rPr lang="en-US" altLang="zh-TW" dirty="0" smtClean="0"/>
+              <a:t> status(check  untrack file)</a:t>
+            </a:r>
+          </a:p>
+          <a:p>
+            <a:pPr marL="0" indent="0">
+              <a:buNone/>
+            </a:pPr>
+            <a:r>
+              <a:rPr lang="en-US" altLang="zh-TW" dirty="0" err="1"/>
+              <a:t>g</a:t>
+            </a:r>
+            <a:r>
+              <a:rPr lang="en-US" altLang="zh-TW" dirty="0" err="1" smtClean="0"/>
+              <a:t>it</a:t>
+            </a:r>
+            <a:r>
+              <a:rPr lang="en-US" altLang="zh-TW" dirty="0" smtClean="0"/>
+              <a:t> add .(track file)</a:t>
+            </a:r>
+          </a:p>
+          <a:p>
+            <a:pPr marL="0" indent="0">
+              <a:buNone/>
+            </a:pPr>
+            <a:r>
+              <a:rPr lang="en-US" altLang="zh-TW" dirty="0" err="1" smtClean="0"/>
+              <a:t>git</a:t>
+            </a:r>
+            <a:r>
+              <a:rPr lang="en-US" altLang="zh-TW" dirty="0" smtClean="0"/>
+              <a:t> commit  –m “commit description”</a:t>
+            </a:r>
+          </a:p>
+          <a:p>
+            <a:pPr marL="0" indent="0">
+              <a:buNone/>
+            </a:pPr>
+            <a:r>
+              <a:rPr lang="en-US" altLang="zh-TW" dirty="0" err="1"/>
+              <a:t>g</a:t>
+            </a:r>
+            <a:r>
+              <a:rPr lang="en-US" altLang="zh-TW" dirty="0" err="1" smtClean="0"/>
+              <a:t>it</a:t>
+            </a:r>
+            <a:r>
+              <a:rPr lang="en-US" altLang="zh-TW" dirty="0" smtClean="0"/>
+              <a:t> log(check commit history)</a:t>
+            </a:r>
+            <a:endParaRPr lang="zh-TW" altLang="en-US" dirty="0"/>
+          </a:p>
+        </p:txBody>
+      </p:sp>
+    </p:spTree>
+    <p:extLst>
+      <p:ext uri="{BB962C8B-B14F-4D97-AF65-F5344CB8AC3E}">
+        <p14:creationId xmlns:p14="http://schemas.microsoft.com/office/powerpoint/2010/main" val="2428529176"/>
+      </p:ext>
+    </p:extLst>
+  </p:cSld>
+  <p:clrMapOvr>
+    <a:masterClrMapping/>
+  </p:clrMapOvr>
+</p:sld>
+</file>
+
+<file path=ppt/slides/slide4.xml><?xml version="1.0" encoding="utf-8"?>
+<p:sld xmlns:a="http://schemas.openxmlformats.org/drawingml/2006/main" xmlns:r="http://schemas.openxmlformats.org/officeDocument/2006/relationships" xmlns:p="http://schemas.openxmlformats.org/presentationml/2006/main">
+  <p:cSld>
+    <p:spTree>
+      <p:nvGrpSpPr>
+        <p:cNvPr id="1" name=""/>
+        <p:cNvGrpSpPr/>
+        <p:nvPr/>
+      </p:nvGrpSpPr>
+      <p:grpSpPr>
+        <a:xfrm>
+          <a:off x="0" y="0"/>
+          <a:ext cx="0" cy="0"/>
+          <a:chOff x="0" y="0"/>
+          <a:chExt cx="0" cy="0"/>
+        </a:xfrm>
+      </p:grpSpPr>
+      <p:sp>
+        <p:nvSpPr>
+          <p:cNvPr id="2" name="標題 1"/>
+          <p:cNvSpPr>
+            <a:spLocks noGrp="1"/>
+          </p:cNvSpPr>
+          <p:nvPr>
+            <p:ph type="title"/>
+          </p:nvPr>
+        </p:nvSpPr>
+        <p:spPr/>
+        <p:txBody>
+          <a:bodyPr/>
+          <a:lstStyle/>
+          <a:p>
+            <a:endParaRPr lang="zh-TW" altLang="en-US"/>
+          </a:p>
+        </p:txBody>
+      </p:sp>
+      <p:sp>
+        <p:nvSpPr>
+          <p:cNvPr id="3" name="內容版面配置區 2"/>
+          <p:cNvSpPr>
+            <a:spLocks noGrp="1"/>
+          </p:cNvSpPr>
+          <p:nvPr>
+            <p:ph idx="1"/>
+          </p:nvPr>
+        </p:nvSpPr>
+        <p:spPr/>
+        <p:txBody>
+          <a:bodyPr/>
+          <a:lstStyle/>
+          <a:p>
+            <a:endParaRPr lang="zh-TW" altLang="en-US"/>
+          </a:p>
+        </p:txBody>
+      </p:sp>
+    </p:spTree>
+    <p:extLst>
+      <p:ext uri="{BB962C8B-B14F-4D97-AF65-F5344CB8AC3E}">
+        <p14:creationId xmlns:p14="http://schemas.microsoft.com/office/powerpoint/2010/main" val="1068680452"/>
+      </p:ext>
+    </p:extLst>
+  </p:cSld>
+  <p:clrMapOvr>
+    <a:masterClrMapping/>
+  </p:clrMapOvr>
+</p:sld>
+</file>
+
+<file path=ppt/slides/slide5.xml><?xml version="1.0" encoding="utf-8"?>
+<p:sld xmlns:a="http://schemas.openxmlformats.org/drawingml/2006/main" xmlns:r="http://schemas.openxmlformats.org/officeDocument/2006/relationships" xmlns:p="http://schemas.openxmlformats.org/presentationml/2006/main">
+  <p:cSld>
+    <p:spTree>
+      <p:nvGrpSpPr>
+        <p:cNvPr id="1" name=""/>
+        <p:cNvGrpSpPr/>
+        <p:nvPr/>
+      </p:nvGrpSpPr>
+      <p:grpSpPr>
+        <a:xfrm>
+          <a:off x="0" y="0"/>
+          <a:ext cx="0" cy="0"/>
+          <a:chOff x="0" y="0"/>
+          <a:chExt cx="0" cy="0"/>
+        </a:xfrm>
+      </p:grpSpPr>
+      <p:sp>
+        <p:nvSpPr>
+          <p:cNvPr id="2" name="標題 1"/>
+          <p:cNvSpPr>
+            <a:spLocks noGrp="1"/>
+          </p:cNvSpPr>
+          <p:nvPr>
+            <p:ph type="title"/>
+          </p:nvPr>
+        </p:nvSpPr>
+        <p:spPr/>
+        <p:txBody>
+          <a:bodyPr/>
+          <a:lstStyle/>
+          <a:p>
+            <a:r>
+              <a:rPr lang="en-US" altLang="zh-TW" dirty="0" err="1" smtClean="0"/>
+              <a:t>Github</a:t>
+            </a:r>
+            <a:endParaRPr lang="zh-TW" altLang="en-US" dirty="0"/>
+          </a:p>
+        </p:txBody>
+      </p:sp>
+      <p:sp>
+        <p:nvSpPr>
+          <p:cNvPr id="3" name="內容版面配置區 2"/>
+          <p:cNvSpPr>
+            <a:spLocks noGrp="1"/>
+          </p:cNvSpPr>
+          <p:nvPr>
+            <p:ph idx="1"/>
+          </p:nvPr>
+        </p:nvSpPr>
+        <p:spPr/>
+        <p:txBody>
+          <a:bodyPr/>
+          <a:lstStyle/>
+          <a:p>
+            <a:endParaRPr lang="zh-TW" altLang="en-US"/>
+          </a:p>
+        </p:txBody>
+      </p:sp>
+    </p:spTree>
+    <p:extLst>
+      <p:ext uri="{BB962C8B-B14F-4D97-AF65-F5344CB8AC3E}">
+        <p14:creationId xmlns:p14="http://schemas.microsoft.com/office/powerpoint/2010/main" val="1156074623"/>
+      </p:ext>
+    </p:extLst>
+  </p:cSld>
+  <p:clrMapOvr>
+    <a:masterClrMapping/>
+  </p:clrMapOvr>
+</p:sld>
+</file>
+
+<file path=ppt/slides/slide6.xml><?xml version="1.0" encoding="utf-8"?>
+<p:sld xmlns:a="http://schemas.openxmlformats.org/drawingml/2006/main" xmlns:r="http://schemas.openxmlformats.org/officeDocument/2006/relationships" xmlns:p="http://schemas.openxmlformats.org/presentationml/2006/main">
+  <p:cSld>
+    <p:spTree>
+      <p:nvGrpSpPr>
+        <p:cNvPr id="1" name=""/>
+        <p:cNvGrpSpPr/>
+        <p:nvPr/>
+      </p:nvGrpSpPr>
+      <p:grpSpPr>
+        <a:xfrm>
+          <a:off x="0" y="0"/>
+          <a:ext cx="0" cy="0"/>
+          <a:chOff x="0" y="0"/>
+          <a:chExt cx="0" cy="0"/>
+        </a:xfrm>
+      </p:grpSpPr>
+      <p:sp>
+        <p:nvSpPr>
+          <p:cNvPr id="2" name="標題 1"/>
+          <p:cNvSpPr>
+            <a:spLocks noGrp="1"/>
+          </p:cNvSpPr>
+          <p:nvPr>
+            <p:ph type="title"/>
+          </p:nvPr>
+        </p:nvSpPr>
+        <p:spPr/>
+        <p:txBody>
+          <a:bodyPr/>
+          <a:lstStyle/>
+          <a:p>
+            <a:endParaRPr lang="zh-TW" altLang="en-US"/>
+          </a:p>
+        </p:txBody>
+      </p:sp>
+      <p:sp>
+        <p:nvSpPr>
+          <p:cNvPr id="3" name="內容版面配置區 2"/>
+          <p:cNvSpPr>
+            <a:spLocks noGrp="1"/>
+          </p:cNvSpPr>
+          <p:nvPr>
+            <p:ph idx="1"/>
+          </p:nvPr>
+        </p:nvSpPr>
+        <p:spPr/>
+        <p:txBody>
+          <a:bodyPr/>
+          <a:lstStyle/>
+          <a:p>
+            <a:r>
+              <a:rPr lang="en-US" altLang="zh-TW" dirty="0" err="1" smtClean="0"/>
+              <a:t>git</a:t>
+            </a:r>
+            <a:r>
+              <a:rPr lang="en-US" altLang="zh-TW" dirty="0" smtClean="0"/>
+              <a:t> clone (clone repository to local) </a:t>
+            </a:r>
+          </a:p>
+          <a:p>
+            <a:r>
+              <a:rPr lang="en-US" altLang="zh-TW" dirty="0" err="1" smtClean="0"/>
+              <a:t>git</a:t>
+            </a:r>
+            <a:r>
+              <a:rPr lang="en-US" altLang="zh-TW" dirty="0" smtClean="0"/>
+              <a:t> push(push local repository to </a:t>
+            </a:r>
+            <a:r>
+              <a:rPr lang="en-US" altLang="zh-TW" dirty="0" err="1" smtClean="0"/>
+              <a:t>github</a:t>
+            </a:r>
+            <a:r>
+              <a:rPr lang="en-US" altLang="zh-TW" dirty="0" smtClean="0"/>
+              <a:t>)</a:t>
+            </a:r>
+          </a:p>
+          <a:p>
+            <a:r>
+              <a:rPr lang="en-US" altLang="zh-TW" dirty="0" err="1" smtClean="0"/>
+              <a:t>git</a:t>
+            </a:r>
+            <a:r>
+              <a:rPr lang="en-US" altLang="zh-TW" dirty="0" smtClean="0"/>
+              <a:t> pull (pull repository from </a:t>
+            </a:r>
+            <a:r>
+              <a:rPr lang="en-US" altLang="zh-TW" dirty="0" err="1" smtClean="0"/>
+              <a:t>github</a:t>
+            </a:r>
+            <a:r>
+              <a:rPr lang="en-US" altLang="zh-TW" dirty="0" smtClean="0"/>
+              <a:t>)</a:t>
+            </a:r>
+            <a:endParaRPr lang="zh-TW" altLang="en-US" dirty="0"/>
+          </a:p>
+        </p:txBody>
+      </p:sp>
+    </p:spTree>
+    <p:extLst>
+      <p:ext uri="{BB962C8B-B14F-4D97-AF65-F5344CB8AC3E}">
+        <p14:creationId xmlns:p14="http://schemas.microsoft.com/office/powerpoint/2010/main" val="1434660974"/>
+      </p:ext>
+    </p:extLst>
+  </p:cSld>
+  <p:clrMapOvr>
+    <a:masterClrMapping/>
+  </p:clrMapOvr>
+</p:sld>
+</file>
+
+<file path=ppt/slides/slide7.xml><?xml version="1.0" encoding="utf-8"?>
+<p:sld xmlns:a="http://schemas.openxmlformats.org/drawingml/2006/main" xmlns:r="http://schemas.openxmlformats.org/officeDocument/2006/relationships" xmlns:p="http://schemas.openxmlformats.org/presentationml/2006/main">
+  <p:cSld>
+    <p:spTree>
+      <p:nvGrpSpPr>
+        <p:cNvPr id="1" name=""/>
+        <p:cNvGrpSpPr/>
+        <p:nvPr/>
+      </p:nvGrpSpPr>
+      <p:grpSpPr>
+        <a:xfrm>
+          <a:off x="0" y="0"/>
+          <a:ext cx="0" cy="0"/>
+          <a:chOff x="0" y="0"/>
+          <a:chExt cx="0" cy="0"/>
+        </a:xfrm>
+      </p:grpSpPr>
+      <p:sp>
+        <p:nvSpPr>
+          <p:cNvPr id="2" name="標題 1"/>
+          <p:cNvSpPr>
+            <a:spLocks noGrp="1"/>
+          </p:cNvSpPr>
+          <p:nvPr>
+            <p:ph type="title"/>
+          </p:nvPr>
+        </p:nvSpPr>
+        <p:spPr/>
+        <p:txBody>
+          <a:bodyPr/>
+          <a:lstStyle/>
+          <a:p>
+            <a:endParaRPr lang="zh-TW" altLang="en-US"/>
+          </a:p>
+        </p:txBody>
+      </p:sp>
+      <p:sp>
+        <p:nvSpPr>
+          <p:cNvPr id="3" name="內容版面配置區 2"/>
+          <p:cNvSpPr>
+            <a:spLocks noGrp="1"/>
+          </p:cNvSpPr>
+          <p:nvPr>
+            <p:ph idx="1"/>
+          </p:nvPr>
+        </p:nvSpPr>
+        <p:spPr/>
+        <p:txBody>
+          <a:bodyPr/>
+          <a:lstStyle/>
+          <a:p>
+            <a:endParaRPr lang="zh-TW" altLang="en-US"/>
+          </a:p>
+        </p:txBody>
+      </p:sp>
+    </p:spTree>
+    <p:extLst>
+      <p:ext uri="{BB962C8B-B14F-4D97-AF65-F5344CB8AC3E}">
+        <p14:creationId xmlns:p14="http://schemas.microsoft.com/office/powerpoint/2010/main" val="51210429"/>
       </p:ext>
     </p:extLst>
   </p:cSld>

</xml_diff>